<commit_message>
[slides] modified slides Lecture 03
</commit_message>
<xml_diff>
--- a/CMQMS_Lecture_03.pptx
+++ b/CMQMS_Lecture_03.pptx
@@ -6,15 +6,16 @@
     <p:sldMasterId id="2147483675" r:id="rId2"/>
   </p:sldMasterIdLst>
   <p:notesMasterIdLst>
-    <p:notesMasterId r:id="rId9"/>
+    <p:notesMasterId r:id="rId10"/>
   </p:notesMasterIdLst>
   <p:sldIdLst>
     <p:sldId id="256" r:id="rId3"/>
     <p:sldId id="457" r:id="rId4"/>
-    <p:sldId id="464" r:id="rId5"/>
-    <p:sldId id="463" r:id="rId6"/>
-    <p:sldId id="465" r:id="rId7"/>
-    <p:sldId id="466" r:id="rId8"/>
+    <p:sldId id="467" r:id="rId5"/>
+    <p:sldId id="464" r:id="rId6"/>
+    <p:sldId id="463" r:id="rId7"/>
+    <p:sldId id="465" r:id="rId8"/>
+    <p:sldId id="466" r:id="rId9"/>
   </p:sldIdLst>
   <p:sldSz cx="9144000" cy="6858000" type="screen4x3"/>
   <p:notesSz cx="6858000" cy="9144000"/>
@@ -215,7 +216,7 @@
             <a:fld id="{C8BCEECD-F39C-4D02-890D-AC0AE91B6A27}" type="datetimeFigureOut">
               <a:rPr lang="en-US" smtClean="0"/>
               <a:pPr/>
-              <a:t>9/24/25</a:t>
+              <a:t>9/30/25</a:t>
             </a:fld>
             <a:endParaRPr lang="en-US"/>
           </a:p>
@@ -726,7 +727,7 @@
     </p:spTree>
     <p:extLst>
       <p:ext uri="{BB962C8B-B14F-4D97-AF65-F5344CB8AC3E}">
-        <p14:creationId xmlns:p14="http://schemas.microsoft.com/office/powerpoint/2010/main" val="3770251231"/>
+        <p14:creationId xmlns:p14="http://schemas.microsoft.com/office/powerpoint/2010/main" val="2820672503"/>
       </p:ext>
     </p:extLst>
   </p:cSld>
@@ -811,7 +812,7 @@
     </p:spTree>
     <p:extLst>
       <p:ext uri="{BB962C8B-B14F-4D97-AF65-F5344CB8AC3E}">
-        <p14:creationId xmlns:p14="http://schemas.microsoft.com/office/powerpoint/2010/main" val="817503628"/>
+        <p14:creationId xmlns:p14="http://schemas.microsoft.com/office/powerpoint/2010/main" val="3770251231"/>
       </p:ext>
     </p:extLst>
   </p:cSld>
@@ -896,7 +897,7 @@
     </p:spTree>
     <p:extLst>
       <p:ext uri="{BB962C8B-B14F-4D97-AF65-F5344CB8AC3E}">
-        <p14:creationId xmlns:p14="http://schemas.microsoft.com/office/powerpoint/2010/main" val="3708576964"/>
+        <p14:creationId xmlns:p14="http://schemas.microsoft.com/office/powerpoint/2010/main" val="817503628"/>
       </p:ext>
     </p:extLst>
   </p:cSld>
@@ -973,6 +974,91 @@
               <a:rPr lang="en-US" smtClean="0"/>
               <a:pPr/>
               <a:t>6</a:t>
+            </a:fld>
+            <a:endParaRPr lang="en-US"/>
+          </a:p>
+        </p:txBody>
+      </p:sp>
+    </p:spTree>
+    <p:extLst>
+      <p:ext uri="{BB962C8B-B14F-4D97-AF65-F5344CB8AC3E}">
+        <p14:creationId xmlns:p14="http://schemas.microsoft.com/office/powerpoint/2010/main" val="3708576964"/>
+      </p:ext>
+    </p:extLst>
+  </p:cSld>
+  <p:clrMapOvr>
+    <a:masterClrMapping/>
+  </p:clrMapOvr>
+</p:notes>
+</file>
+
+<file path=ppt/notesSlides/notesSlide7.xml><?xml version="1.0" encoding="utf-8"?>
+<p:notes xmlns:a="http://schemas.openxmlformats.org/drawingml/2006/main" xmlns:r="http://schemas.openxmlformats.org/officeDocument/2006/relationships" xmlns:p="http://schemas.openxmlformats.org/presentationml/2006/main">
+  <p:cSld>
+    <p:spTree>
+      <p:nvGrpSpPr>
+        <p:cNvPr id="1" name=""/>
+        <p:cNvGrpSpPr/>
+        <p:nvPr/>
+      </p:nvGrpSpPr>
+      <p:grpSpPr>
+        <a:xfrm>
+          <a:off x="0" y="0"/>
+          <a:ext cx="0" cy="0"/>
+          <a:chOff x="0" y="0"/>
+          <a:chExt cx="0" cy="0"/>
+        </a:xfrm>
+      </p:grpSpPr>
+      <p:sp>
+        <p:nvSpPr>
+          <p:cNvPr id="2" name="Slide Image Placeholder 1"/>
+          <p:cNvSpPr>
+            <a:spLocks noGrp="1" noRot="1" noChangeAspect="1"/>
+          </p:cNvSpPr>
+          <p:nvPr>
+            <p:ph type="sldImg"/>
+          </p:nvPr>
+        </p:nvSpPr>
+        <p:spPr/>
+      </p:sp>
+      <p:sp>
+        <p:nvSpPr>
+          <p:cNvPr id="3" name="Notes Placeholder 2"/>
+          <p:cNvSpPr>
+            <a:spLocks noGrp="1"/>
+          </p:cNvSpPr>
+          <p:nvPr>
+            <p:ph type="body" idx="1"/>
+          </p:nvPr>
+        </p:nvSpPr>
+        <p:spPr/>
+        <p:txBody>
+          <a:bodyPr/>
+          <a:lstStyle/>
+          <a:p>
+            <a:endParaRPr lang="en-US" dirty="0"/>
+          </a:p>
+        </p:txBody>
+      </p:sp>
+      <p:sp>
+        <p:nvSpPr>
+          <p:cNvPr id="4" name="Slide Number Placeholder 3"/>
+          <p:cNvSpPr>
+            <a:spLocks noGrp="1"/>
+          </p:cNvSpPr>
+          <p:nvPr>
+            <p:ph type="sldNum" sz="quarter" idx="5"/>
+          </p:nvPr>
+        </p:nvSpPr>
+        <p:spPr/>
+        <p:txBody>
+          <a:bodyPr/>
+          <a:lstStyle/>
+          <a:p>
+            <a:fld id="{04D8C5A7-0305-4EBC-87F9-6BE751D08921}" type="slidenum">
+              <a:rPr lang="en-US" smtClean="0"/>
+              <a:pPr/>
+              <a:t>7</a:t>
             </a:fld>
             <a:endParaRPr lang="en-US"/>
           </a:p>
@@ -7966,6 +8052,395 @@
             <a:pPr algn="l"/>
             <a:r>
               <a:rPr lang="en-GB" sz="2400" b="1" dirty="0"/>
+              <a:t>Tutorials</a:t>
+            </a:r>
+            <a:endParaRPr lang="en-GB" sz="2400" b="1" dirty="0">
+              <a:solidFill>
+                <a:srgbClr val="92D050"/>
+              </a:solidFill>
+            </a:endParaRPr>
+          </a:p>
+        </p:txBody>
+      </p:sp>
+      <p:sp>
+        <p:nvSpPr>
+          <p:cNvPr id="23" name="Titel 3">
+            <a:extLst>
+              <a:ext uri="{FF2B5EF4-FFF2-40B4-BE49-F238E27FC236}">
+                <a16:creationId xmlns:a16="http://schemas.microsoft.com/office/drawing/2014/main" id="{E05100DB-5766-C148-8F5A-667DB4B160B8}"/>
+              </a:ext>
+            </a:extLst>
+          </p:cNvPr>
+          <p:cNvSpPr txBox="1">
+            <a:spLocks/>
+          </p:cNvSpPr>
+          <p:nvPr/>
+        </p:nvSpPr>
+        <p:spPr>
+          <a:xfrm>
+            <a:off x="827584" y="44624"/>
+            <a:ext cx="7776864" cy="792088"/>
+          </a:xfrm>
+          <a:prstGeom prst="rect">
+            <a:avLst/>
+          </a:prstGeom>
+        </p:spPr>
+        <p:txBody>
+          <a:bodyPr vert="horz" lIns="91440" tIns="45720" rIns="91440" bIns="45720" rtlCol="0" anchor="ctr">
+            <a:normAutofit/>
+          </a:bodyPr>
+          <a:lstStyle>
+            <a:lvl1pPr algn="ctr" defTabSz="914400" rtl="0" eaLnBrk="1" latinLnBrk="0" hangingPunct="1">
+              <a:spcBef>
+                <a:spcPct val="0"/>
+              </a:spcBef>
+              <a:buNone/>
+              <a:defRPr lang="ko-KR" altLang="en-US" sz="4400" kern="1200" dirty="0">
+                <a:solidFill>
+                  <a:schemeClr val="tx1"/>
+                </a:solidFill>
+                <a:latin typeface="+mj-lt"/>
+                <a:ea typeface="+mj-ea"/>
+                <a:cs typeface="+mj-cs"/>
+              </a:defRPr>
+            </a:lvl1pPr>
+          </a:lstStyle>
+          <a:p>
+            <a:endParaRPr lang="en-GB" sz="2400" b="1" dirty="0">
+              <a:solidFill>
+                <a:srgbClr val="FF0000"/>
+              </a:solidFill>
+            </a:endParaRPr>
+          </a:p>
+        </p:txBody>
+      </p:sp>
+      <p:sp>
+        <p:nvSpPr>
+          <p:cNvPr id="5" name="TextBox 4">
+            <a:extLst>
+              <a:ext uri="{FF2B5EF4-FFF2-40B4-BE49-F238E27FC236}">
+                <a16:creationId xmlns:a16="http://schemas.microsoft.com/office/drawing/2014/main" id="{A31390D8-8D7E-4D3D-26FB-C7F0D0105CA0}"/>
+              </a:ext>
+            </a:extLst>
+          </p:cNvPr>
+          <p:cNvSpPr txBox="1"/>
+          <p:nvPr/>
+        </p:nvSpPr>
+        <p:spPr>
+          <a:xfrm>
+            <a:off x="389914" y="1556792"/>
+            <a:ext cx="4178965" cy="1477328"/>
+          </a:xfrm>
+          <a:prstGeom prst="rect">
+            <a:avLst/>
+          </a:prstGeom>
+          <a:noFill/>
+        </p:spPr>
+        <p:txBody>
+          <a:bodyPr wrap="none" rtlCol="0">
+            <a:spAutoFit/>
+          </a:bodyPr>
+          <a:lstStyle/>
+          <a:p>
+            <a:r>
+              <a:rPr lang="en-DE" dirty="0"/>
+              <a:t>Please check, whether you can connect to:</a:t>
+            </a:r>
+          </a:p>
+          <a:p>
+            <a:endParaRPr lang="en-DE" dirty="0"/>
+          </a:p>
+          <a:p>
+            <a:r>
+              <a:rPr lang="en-GB" dirty="0" err="1"/>
+              <a:t>sdsc-binder.flatironinstitute.org</a:t>
+            </a:r>
+            <a:endParaRPr lang="en-DE" dirty="0"/>
+          </a:p>
+          <a:p>
+            <a:r>
+              <a:rPr lang="en-GB" dirty="0"/>
+              <a:t>Owner: </a:t>
+            </a:r>
+            <a:r>
+              <a:rPr lang="en-GB" dirty="0" err="1"/>
+              <a:t>ccq</a:t>
+            </a:r>
+            <a:endParaRPr lang="en-GB" dirty="0"/>
+          </a:p>
+          <a:p>
+            <a:r>
+              <a:rPr lang="en-GB" dirty="0"/>
+              <a:t>Project: CMQMS</a:t>
+            </a:r>
+            <a:endParaRPr lang="en-DE" dirty="0"/>
+          </a:p>
+        </p:txBody>
+      </p:sp>
+      <p:pic>
+        <p:nvPicPr>
+          <p:cNvPr id="6" name="Picture 4" descr="About TRIQS — TRIQS 3.3.1 documentation">
+            <a:extLst>
+              <a:ext uri="{FF2B5EF4-FFF2-40B4-BE49-F238E27FC236}">
+                <a16:creationId xmlns:a16="http://schemas.microsoft.com/office/drawing/2014/main" id="{CB583F33-C7EE-2135-CAD1-A99604B7BC0D}"/>
+              </a:ext>
+            </a:extLst>
+          </p:cNvPr>
+          <p:cNvPicPr>
+            <a:picLocks noChangeAspect="1" noChangeArrowheads="1"/>
+          </p:cNvPicPr>
+          <p:nvPr/>
+        </p:nvPicPr>
+        <p:blipFill>
+          <a:blip r:embed="rId3">
+            <a:extLst>
+              <a:ext uri="{28A0092B-C50C-407E-A947-70E740481C1C}">
+                <a14:useLocalDpi xmlns:a14="http://schemas.microsoft.com/office/drawing/2010/main" val="0"/>
+              </a:ext>
+            </a:extLst>
+          </a:blip>
+          <a:srcRect/>
+          <a:stretch>
+            <a:fillRect/>
+          </a:stretch>
+        </p:blipFill>
+        <p:spPr bwMode="auto">
+          <a:xfrm>
+            <a:off x="2555776" y="2853303"/>
+            <a:ext cx="2458120" cy="559615"/>
+          </a:xfrm>
+          <a:prstGeom prst="rect">
+            <a:avLst/>
+          </a:prstGeom>
+          <a:noFill/>
+          <a:extLst>
+            <a:ext uri="{909E8E84-426E-40DD-AFC4-6F175D3DCCD1}">
+              <a14:hiddenFill xmlns:a14="http://schemas.microsoft.com/office/drawing/2010/main">
+                <a:solidFill>
+                  <a:srgbClr val="FFFFFF"/>
+                </a:solidFill>
+              </a14:hiddenFill>
+            </a:ext>
+          </a:extLst>
+        </p:spPr>
+      </p:pic>
+      <p:sp>
+        <p:nvSpPr>
+          <p:cNvPr id="9" name="TextBox 8">
+            <a:extLst>
+              <a:ext uri="{FF2B5EF4-FFF2-40B4-BE49-F238E27FC236}">
+                <a16:creationId xmlns:a16="http://schemas.microsoft.com/office/drawing/2014/main" id="{0AA41AB8-EFB0-AC78-4103-948E0195367F}"/>
+              </a:ext>
+            </a:extLst>
+          </p:cNvPr>
+          <p:cNvSpPr txBox="1"/>
+          <p:nvPr/>
+        </p:nvSpPr>
+        <p:spPr>
+          <a:xfrm>
+            <a:off x="3203848" y="3508851"/>
+            <a:ext cx="4528163" cy="646331"/>
+          </a:xfrm>
+          <a:prstGeom prst="rect">
+            <a:avLst/>
+          </a:prstGeom>
+          <a:noFill/>
+        </p:spPr>
+        <p:txBody>
+          <a:bodyPr wrap="square" rtlCol="0">
+            <a:spAutoFit/>
+          </a:bodyPr>
+          <a:lstStyle/>
+          <a:p>
+            <a:r>
+              <a:rPr lang="en-GB" b="1" i="0" u="none" strike="noStrike" dirty="0">
+                <a:solidFill>
+                  <a:srgbClr val="404040"/>
+                </a:solidFill>
+                <a:effectLst/>
+                <a:latin typeface="Lato" panose="020F0502020204030203" pitchFamily="34" charset="0"/>
+              </a:rPr>
+              <a:t>T</a:t>
+            </a:r>
+            <a:r>
+              <a:rPr lang="en-GB" b="0" i="0" u="none" strike="noStrike" dirty="0">
+                <a:solidFill>
+                  <a:srgbClr val="404040"/>
+                </a:solidFill>
+                <a:effectLst/>
+                <a:latin typeface="Lato" panose="020F0502020204030203" pitchFamily="34" charset="0"/>
+              </a:rPr>
+              <a:t>oolbox for </a:t>
+            </a:r>
+            <a:r>
+              <a:rPr lang="en-GB" b="1" i="0" u="none" strike="noStrike" dirty="0">
+                <a:solidFill>
+                  <a:srgbClr val="404040"/>
+                </a:solidFill>
+                <a:effectLst/>
+                <a:latin typeface="Lato" panose="020F0502020204030203" pitchFamily="34" charset="0"/>
+              </a:rPr>
+              <a:t>R</a:t>
+            </a:r>
+            <a:r>
+              <a:rPr lang="en-GB" b="0" i="0" u="none" strike="noStrike" dirty="0">
+                <a:solidFill>
+                  <a:srgbClr val="404040"/>
+                </a:solidFill>
+                <a:effectLst/>
+                <a:latin typeface="Lato" panose="020F0502020204030203" pitchFamily="34" charset="0"/>
+              </a:rPr>
+              <a:t>esearch on </a:t>
+            </a:r>
+            <a:r>
+              <a:rPr lang="en-GB" b="1" i="0" u="none" strike="noStrike" dirty="0">
+                <a:solidFill>
+                  <a:srgbClr val="404040"/>
+                </a:solidFill>
+                <a:effectLst/>
+                <a:latin typeface="Lato" panose="020F0502020204030203" pitchFamily="34" charset="0"/>
+              </a:rPr>
+              <a:t>I</a:t>
+            </a:r>
+            <a:r>
+              <a:rPr lang="en-GB" b="0" i="0" u="none" strike="noStrike" dirty="0">
+                <a:solidFill>
+                  <a:srgbClr val="404040"/>
+                </a:solidFill>
+                <a:effectLst/>
+                <a:latin typeface="Lato" panose="020F0502020204030203" pitchFamily="34" charset="0"/>
+              </a:rPr>
+              <a:t>nteracting </a:t>
+            </a:r>
+            <a:r>
+              <a:rPr lang="en-GB" b="1" i="0" u="none" strike="noStrike" dirty="0">
+                <a:solidFill>
+                  <a:srgbClr val="404040"/>
+                </a:solidFill>
+                <a:effectLst/>
+                <a:latin typeface="Lato" panose="020F0502020204030203" pitchFamily="34" charset="0"/>
+              </a:rPr>
+              <a:t>Q</a:t>
+            </a:r>
+            <a:r>
+              <a:rPr lang="en-GB" b="0" i="0" u="none" strike="noStrike" dirty="0">
+                <a:solidFill>
+                  <a:srgbClr val="404040"/>
+                </a:solidFill>
+                <a:effectLst/>
+                <a:latin typeface="Lato" panose="020F0502020204030203" pitchFamily="34" charset="0"/>
+              </a:rPr>
+              <a:t>uantum </a:t>
+            </a:r>
+            <a:r>
+              <a:rPr lang="en-GB" b="1" i="0" u="none" strike="noStrike" dirty="0">
+                <a:solidFill>
+                  <a:srgbClr val="404040"/>
+                </a:solidFill>
+                <a:effectLst/>
+                <a:latin typeface="Lato" panose="020F0502020204030203" pitchFamily="34" charset="0"/>
+              </a:rPr>
+              <a:t>S</a:t>
+            </a:r>
+            <a:r>
+              <a:rPr lang="en-GB" b="0" i="0" u="none" strike="noStrike" dirty="0">
+                <a:solidFill>
+                  <a:srgbClr val="404040"/>
+                </a:solidFill>
+                <a:effectLst/>
+                <a:latin typeface="Lato" panose="020F0502020204030203" pitchFamily="34" charset="0"/>
+              </a:rPr>
+              <a:t>ystems</a:t>
+            </a:r>
+            <a:endParaRPr lang="en-DE" dirty="0"/>
+          </a:p>
+        </p:txBody>
+      </p:sp>
+      <p:pic>
+        <p:nvPicPr>
+          <p:cNvPr id="12" name="Picture 11">
+            <a:extLst>
+              <a:ext uri="{FF2B5EF4-FFF2-40B4-BE49-F238E27FC236}">
+                <a16:creationId xmlns:a16="http://schemas.microsoft.com/office/drawing/2014/main" id="{DD8C3A73-9240-58A9-3C59-22555F5609D2}"/>
+              </a:ext>
+            </a:extLst>
+          </p:cNvPr>
+          <p:cNvPicPr>
+            <a:picLocks noChangeAspect="1"/>
+          </p:cNvPicPr>
+          <p:nvPr/>
+        </p:nvPicPr>
+        <p:blipFill>
+          <a:blip r:embed="rId4"/>
+          <a:stretch>
+            <a:fillRect/>
+          </a:stretch>
+        </p:blipFill>
+        <p:spPr>
+          <a:xfrm>
+            <a:off x="3059832" y="4221089"/>
+            <a:ext cx="5544616" cy="1877864"/>
+          </a:xfrm>
+          <a:prstGeom prst="rect">
+            <a:avLst/>
+          </a:prstGeom>
+        </p:spPr>
+      </p:pic>
+    </p:spTree>
+    <p:extLst>
+      <p:ext uri="{BB962C8B-B14F-4D97-AF65-F5344CB8AC3E}">
+        <p14:creationId xmlns:p14="http://schemas.microsoft.com/office/powerpoint/2010/main" val="158111479"/>
+      </p:ext>
+    </p:extLst>
+  </p:cSld>
+  <p:clrMapOvr>
+    <a:masterClrMapping/>
+  </p:clrMapOvr>
+</p:sld>
+</file>
+
+<file path=ppt/slides/slide3.xml><?xml version="1.0" encoding="utf-8"?>
+<p:sld xmlns:a="http://schemas.openxmlformats.org/drawingml/2006/main" xmlns:r="http://schemas.openxmlformats.org/officeDocument/2006/relationships" xmlns:p="http://schemas.openxmlformats.org/presentationml/2006/main">
+  <p:cSld>
+    <p:spTree>
+      <p:nvGrpSpPr>
+        <p:cNvPr id="1" name=""/>
+        <p:cNvGrpSpPr/>
+        <p:nvPr/>
+      </p:nvGrpSpPr>
+      <p:grpSpPr>
+        <a:xfrm>
+          <a:off x="0" y="0"/>
+          <a:ext cx="0" cy="0"/>
+          <a:chOff x="0" y="0"/>
+          <a:chExt cx="0" cy="0"/>
+        </a:xfrm>
+      </p:grpSpPr>
+      <p:sp>
+        <p:nvSpPr>
+          <p:cNvPr id="22" name="Title 3"/>
+          <p:cNvSpPr>
+            <a:spLocks noGrp="1"/>
+          </p:cNvSpPr>
+          <p:nvPr>
+            <p:ph type="title"/>
+          </p:nvPr>
+        </p:nvSpPr>
+        <p:spPr>
+          <a:xfrm>
+            <a:off x="0" y="16778"/>
+            <a:ext cx="9144000" cy="1069514"/>
+          </a:xfrm>
+        </p:spPr>
+        <p:txBody>
+          <a:bodyPr>
+            <a:normAutofit/>
+          </a:bodyPr>
+          <a:lstStyle/>
+          <a:p>
+            <a:pPr algn="l"/>
+            <a:r>
+              <a:rPr lang="en-GB" sz="2400" b="1" dirty="0"/>
               <a:t>The full solid-state Hamiltonian</a:t>
             </a:r>
             <a:endParaRPr lang="en-GB" sz="2400" b="1" dirty="0">
@@ -8359,7 +8834,7 @@
     </p:spTree>
     <p:extLst>
       <p:ext uri="{BB962C8B-B14F-4D97-AF65-F5344CB8AC3E}">
-        <p14:creationId xmlns:p14="http://schemas.microsoft.com/office/powerpoint/2010/main" val="158111479"/>
+        <p14:creationId xmlns:p14="http://schemas.microsoft.com/office/powerpoint/2010/main" val="742518465"/>
       </p:ext>
     </p:extLst>
   </p:cSld>
@@ -8369,7 +8844,7 @@
 </p:sld>
 </file>
 
-<file path=ppt/slides/slide3.xml><?xml version="1.0" encoding="utf-8"?>
+<file path=ppt/slides/slide4.xml><?xml version="1.0" encoding="utf-8"?>
 <p:sld xmlns:a="http://schemas.openxmlformats.org/drawingml/2006/main" xmlns:r="http://schemas.openxmlformats.org/officeDocument/2006/relationships" xmlns:p="http://schemas.openxmlformats.org/presentationml/2006/main">
   <p:cSld>
     <p:spTree>
@@ -10155,7 +10630,7 @@
 </p:sld>
 </file>
 
-<file path=ppt/slides/slide4.xml><?xml version="1.0" encoding="utf-8"?>
+<file path=ppt/slides/slide5.xml><?xml version="1.0" encoding="utf-8"?>
 <p:sld xmlns:a="http://schemas.openxmlformats.org/drawingml/2006/main" xmlns:r="http://schemas.openxmlformats.org/officeDocument/2006/relationships" xmlns:p="http://schemas.openxmlformats.org/presentationml/2006/main">
   <p:cSld>
     <p:spTree>
@@ -10362,7 +10837,7 @@
 </p:sld>
 </file>
 
-<file path=ppt/slides/slide5.xml><?xml version="1.0" encoding="utf-8"?>
+<file path=ppt/slides/slide6.xml><?xml version="1.0" encoding="utf-8"?>
 <p:sld xmlns:a="http://schemas.openxmlformats.org/drawingml/2006/main" xmlns:r="http://schemas.openxmlformats.org/officeDocument/2006/relationships" xmlns:p="http://schemas.openxmlformats.org/presentationml/2006/main">
   <p:cSld>
     <p:spTree>
@@ -11987,7 +12462,7 @@
 </p:sld>
 </file>
 
-<file path=ppt/slides/slide6.xml><?xml version="1.0" encoding="utf-8"?>
+<file path=ppt/slides/slide7.xml><?xml version="1.0" encoding="utf-8"?>
 <p:sld xmlns:a="http://schemas.openxmlformats.org/drawingml/2006/main" xmlns:r="http://schemas.openxmlformats.org/officeDocument/2006/relationships" xmlns:p="http://schemas.openxmlformats.org/presentationml/2006/main">
   <p:cSld>
     <p:spTree>

</xml_diff>